<commit_message>
add to add a link to Jordi doc; add Ingmar cascading slides
</commit_message>
<xml_diff>
--- a/meetings-ietf/ietf-116/slides-116-multi-domain-2023-03-26.pptx
+++ b/meetings-ietf/ietf-116/slides-116-multi-domain-2023-03-26.pptx
@@ -8015,7 +8015,7 @@
               <a:rPr lang="en-US" altLang="x-none" sz="2400" noProof="1">
                 <a:ea typeface="ＭＳ Ｐゴシック" charset="-128"/>
               </a:rPr>
-              <a:t>Presenter: Mario Lassnig, Ingmar Poese, </a:t>
+              <a:t>Mario Lassnig, Ingmar Poese, </a:t>
             </a:r>
             <a:br>
               <a:rPr lang="en-US" altLang="x-none" sz="2400" noProof="1">
@@ -9794,7 +9794,14 @@
             <a:pPr fontAlgn="base"/>
             <a:r>
               <a:rPr lang="en-US" dirty="0"/>
-              <a:t>CERN use case</a:t>
+              <a:t>Latest CERN use case: TCN</a:t>
+            </a:r>
+          </a:p>
+          <a:p>
+            <a:pPr fontAlgn="base"/>
+            <a:r>
+              <a:rPr lang="en-US" dirty="0"/>
+              <a:t>Old CERN use case</a:t>
             </a:r>
           </a:p>
           <a:p>
@@ -18982,8 +18989,15 @@
           <a:p>
             <a:r>
               <a:rPr lang="en-US" dirty="0"/>
-              <a:t>Details see Jordi Ros Giralt work</a:t>
-            </a:r>
+              <a:t>Details see </a:t>
+            </a:r>
+            <a:r>
+              <a:rPr lang="en-US" dirty="0">
+                <a:hlinkClick r:id="rId2"/>
+              </a:rPr>
+              <a:t>https://datatracker.ietf.org/doc/draft-giraltyellamraju-alto-bsg-multidomain/</a:t>
+            </a:r>
+            <a:endParaRPr lang="en-US" dirty="0"/>
           </a:p>
         </p:txBody>
       </p:sp>

</xml_diff>